<commit_message>
Finished first showable draft itenium powerpoint
</commit_message>
<xml_diff>
--- a/itenium.pptx
+++ b/itenium.pptx
@@ -11,8 +11,8 @@
     <p:sldId id="259" r:id="rId5"/>
     <p:sldId id="258" r:id="rId6"/>
     <p:sldId id="264" r:id="rId7"/>
-    <p:sldId id="260" r:id="rId8"/>
-    <p:sldId id="262" r:id="rId9"/>
+    <p:sldId id="262" r:id="rId8"/>
+    <p:sldId id="260" r:id="rId9"/>
     <p:sldId id="261" r:id="rId10"/>
   </p:sldIdLst>
   <p:sldSz cx="9144000" cy="6858000" type="screen4x3"/>
@@ -302,7 +302,7 @@
           <a:p>
             <a:fld id="{342B3B88-14E2-4D32-89A0-22D2C298015E}" type="datetimeFigureOut">
               <a:rPr lang="nl-BE" smtClean="0"/>
-              <a:t>15/11/2017</a:t>
+              <a:t>7/01/2018</a:t>
             </a:fld>
             <a:endParaRPr lang="nl-BE"/>
           </a:p>
@@ -467,7 +467,7 @@
           <a:p>
             <a:fld id="{342B3B88-14E2-4D32-89A0-22D2C298015E}" type="datetimeFigureOut">
               <a:rPr lang="nl-BE" smtClean="0"/>
-              <a:t>15/11/2017</a:t>
+              <a:t>7/01/2018</a:t>
             </a:fld>
             <a:endParaRPr lang="nl-BE"/>
           </a:p>
@@ -642,7 +642,7 @@
           <a:p>
             <a:fld id="{342B3B88-14E2-4D32-89A0-22D2C298015E}" type="datetimeFigureOut">
               <a:rPr lang="nl-BE" smtClean="0"/>
-              <a:t>15/11/2017</a:t>
+              <a:t>7/01/2018</a:t>
             </a:fld>
             <a:endParaRPr lang="nl-BE"/>
           </a:p>
@@ -807,7 +807,7 @@
           <a:p>
             <a:fld id="{342B3B88-14E2-4D32-89A0-22D2C298015E}" type="datetimeFigureOut">
               <a:rPr lang="nl-BE" smtClean="0"/>
-              <a:t>15/11/2017</a:t>
+              <a:t>7/01/2018</a:t>
             </a:fld>
             <a:endParaRPr lang="nl-BE"/>
           </a:p>
@@ -1046,7 +1046,7 @@
           <a:p>
             <a:fld id="{342B3B88-14E2-4D32-89A0-22D2C298015E}" type="datetimeFigureOut">
               <a:rPr lang="nl-BE" smtClean="0"/>
-              <a:t>15/11/2017</a:t>
+              <a:t>7/01/2018</a:t>
             </a:fld>
             <a:endParaRPr lang="nl-BE"/>
           </a:p>
@@ -1136,7 +1136,7 @@
           <a:p>
             <a:fld id="{342B3B88-14E2-4D32-89A0-22D2C298015E}" type="datetimeFigureOut">
               <a:rPr lang="nl-BE" smtClean="0"/>
-              <a:t>15/11/2017</a:t>
+              <a:t>7/01/2018</a:t>
             </a:fld>
             <a:endParaRPr lang="nl-BE"/>
           </a:p>
@@ -1510,7 +1510,7 @@
           <a:p>
             <a:fld id="{342B3B88-14E2-4D32-89A0-22D2C298015E}" type="datetimeFigureOut">
               <a:rPr lang="nl-BE" smtClean="0"/>
-              <a:t>15/11/2017</a:t>
+              <a:t>7/01/2018</a:t>
             </a:fld>
             <a:endParaRPr lang="nl-BE"/>
           </a:p>
@@ -1765,7 +1765,7 @@
           <a:p>
             <a:fld id="{342B3B88-14E2-4D32-89A0-22D2C298015E}" type="datetimeFigureOut">
               <a:rPr lang="nl-BE" smtClean="0"/>
-              <a:t>15/11/2017</a:t>
+              <a:t>7/01/2018</a:t>
             </a:fld>
             <a:endParaRPr lang="nl-BE"/>
           </a:p>
@@ -1855,7 +1855,7 @@
           <a:p>
             <a:fld id="{342B3B88-14E2-4D32-89A0-22D2C298015E}" type="datetimeFigureOut">
               <a:rPr lang="nl-BE" smtClean="0"/>
-              <a:t>15/11/2017</a:t>
+              <a:t>7/01/2018</a:t>
             </a:fld>
             <a:endParaRPr lang="nl-BE"/>
           </a:p>
@@ -2129,7 +2129,7 @@
           <a:p>
             <a:fld id="{342B3B88-14E2-4D32-89A0-22D2C298015E}" type="datetimeFigureOut">
               <a:rPr lang="nl-BE" smtClean="0"/>
-              <a:t>15/11/2017</a:t>
+              <a:t>7/01/2018</a:t>
             </a:fld>
             <a:endParaRPr lang="nl-BE"/>
           </a:p>
@@ -2401,7 +2401,7 @@
           <a:p>
             <a:fld id="{342B3B88-14E2-4D32-89A0-22D2C298015E}" type="datetimeFigureOut">
               <a:rPr lang="nl-BE" smtClean="0"/>
-              <a:t>15/11/2017</a:t>
+              <a:t>7/01/2018</a:t>
             </a:fld>
             <a:endParaRPr lang="nl-BE"/>
           </a:p>
@@ -2701,7 +2701,7 @@
           <a:p>
             <a:fld id="{342B3B88-14E2-4D32-89A0-22D2C298015E}" type="datetimeFigureOut">
               <a:rPr lang="nl-BE" smtClean="0"/>
-              <a:t>15/11/2017</a:t>
+              <a:t>7/01/2018</a:t>
             </a:fld>
             <a:endParaRPr lang="nl-BE"/>
           </a:p>
@@ -3375,7 +3375,7 @@
         <p:spPr/>
         <p:txBody>
           <a:bodyPr>
-            <a:normAutofit lnSpcReduction="10000"/>
+            <a:normAutofit fontScale="92500" lnSpcReduction="20000"/>
           </a:bodyPr>
           <a:lstStyle/>
           <a:p>
@@ -3384,58 +3384,85 @@
             </a:pPr>
             <a:r>
               <a:rPr lang="nl-BE" dirty="0" smtClean="0"/>
-              <a:t>Een jong dynamisch bedrijf dat gepassioneerde en gemotiveerde mensen </a:t>
-            </a:r>
-            <a:r>
-              <a:rPr lang="nl-BE" dirty="0" smtClean="0"/>
-              <a:t>samenbrengt die tal van opleidingsmogelijkheden krijgen en die de extra mile gaan voor onze klanten.</a:t>
-            </a:r>
+              <a:t>Een jong dynamisch bedrijf dat gepassioneerde en gemotiveerde mensen samenbrengt die tal van opleidingsmogelijkheden krijgen en die de extra mile gaan voor onze klanten.</a:t>
+            </a:r>
+          </a:p>
+          <a:p>
             <a:endParaRPr lang="nl-BE" dirty="0" smtClean="0"/>
           </a:p>
           <a:p>
+            <a:r>
+              <a:rPr lang="nl-BE" dirty="0" smtClean="0"/>
+              <a:t>Tevreden en goed getrainde werknemers</a:t>
+            </a:r>
+          </a:p>
+          <a:p>
+            <a:pPr lvl="1"/>
+            <a:r>
+              <a:rPr lang="nl-BE" dirty="0"/>
+              <a:t>Team </a:t>
+            </a:r>
+            <a:r>
+              <a:rPr lang="nl-BE" dirty="0" smtClean="0"/>
+              <a:t>events</a:t>
+            </a:r>
+          </a:p>
+          <a:p>
+            <a:pPr lvl="1"/>
+            <a:r>
+              <a:rPr lang="nl-BE" dirty="0"/>
+              <a:t>Technische </a:t>
+            </a:r>
+            <a:r>
+              <a:rPr lang="nl-BE" dirty="0" smtClean="0"/>
+              <a:t>sessies, bootcamps &amp; </a:t>
+            </a:r>
+            <a:r>
+              <a:rPr lang="nl-BE" dirty="0"/>
+              <a:t>conferenties</a:t>
+            </a:r>
+            <a:endParaRPr lang="nl-BE" dirty="0" smtClean="0"/>
+          </a:p>
+          <a:p>
+            <a:pPr lvl="1"/>
+            <a:r>
+              <a:rPr lang="nl-BE" dirty="0" smtClean="0"/>
+              <a:t>Individuele trainingen</a:t>
+            </a:r>
             <a:endParaRPr lang="nl-BE" dirty="0"/>
           </a:p>
           <a:p>
-            <a:r>
-              <a:rPr lang="nl-BE" dirty="0" smtClean="0"/>
-              <a:t>Technische sessies, personal trainings</a:t>
-            </a:r>
-            <a:r>
-              <a:rPr lang="nl-BE" dirty="0" smtClean="0"/>
-              <a:t>, </a:t>
-            </a:r>
-            <a:r>
-              <a:rPr lang="nl-BE" dirty="0" smtClean="0"/>
-              <a:t>bootcamps</a:t>
-            </a:r>
-            <a:r>
-              <a:rPr lang="nl-BE" dirty="0" smtClean="0"/>
-              <a:t>, conferenties</a:t>
-            </a:r>
-          </a:p>
-          <a:p>
-            <a:r>
-              <a:rPr lang="nl-BE" dirty="0" smtClean="0"/>
-              <a:t>Team events</a:t>
-            </a:r>
-          </a:p>
-          <a:p>
-            <a:r>
-              <a:rPr lang="nl-BE" dirty="0" smtClean="0"/>
-              <a:t>Goede loonsvoorwaarden</a:t>
-            </a:r>
-          </a:p>
-          <a:p>
-            <a:r>
-              <a:rPr lang="nl-BE" dirty="0" smtClean="0"/>
-              <a:t>Keeping our people &amp; customers happy is our main focus</a:t>
-            </a:r>
-          </a:p>
-          <a:p>
-            <a:r>
-              <a:rPr lang="nl-BE" dirty="0" smtClean="0"/>
-              <a:t>Cozy group</a:t>
-            </a:r>
+            <a:pPr lvl="1"/>
+            <a:endParaRPr lang="nl-BE" dirty="0"/>
+          </a:p>
+          <a:p>
+            <a:r>
+              <a:rPr lang="nl-BE" dirty="0" smtClean="0"/>
+              <a:t>Tevreden klanten - ons hoofddoel</a:t>
+            </a:r>
+            <a:endParaRPr lang="nl-BE" dirty="0" smtClean="0"/>
+          </a:p>
+          <a:p>
+            <a:pPr lvl="1"/>
+            <a:r>
+              <a:rPr lang="nl-BE" dirty="0" smtClean="0"/>
+              <a:t>Toewijding</a:t>
+            </a:r>
+          </a:p>
+          <a:p>
+            <a:pPr lvl="1"/>
+            <a:r>
+              <a:rPr lang="nl-BE" dirty="0" smtClean="0"/>
+              <a:t>Gedisciplineerde &amp; professionele aanpak</a:t>
+            </a:r>
+          </a:p>
+          <a:p>
+            <a:pPr lvl="1"/>
+            <a:r>
+              <a:rPr lang="nl-BE" dirty="0" smtClean="0"/>
+              <a:t>Transparante communicatie</a:t>
+            </a:r>
+            <a:endParaRPr lang="nl-BE" dirty="0" smtClean="0"/>
           </a:p>
           <a:p>
             <a:pPr marL="45720" indent="0">
@@ -3520,15 +3547,17 @@
           <a:lstStyle/>
           <a:p>
             <a:r>
-              <a:rPr lang="nl-BE" dirty="0"/>
-              <a:t>Top 25% </a:t>
-            </a:r>
-            <a:r>
-              <a:rPr lang="nl-BE" dirty="0" smtClean="0"/>
-              <a:t>developers </a:t>
-            </a:r>
-          </a:p>
-          <a:p>
+              <a:rPr lang="nl-BE" dirty="0" smtClean="0"/>
+              <a:t>Beste d</a:t>
+            </a:r>
+            <a:r>
+              <a:rPr lang="nl-BE" dirty="0" smtClean="0"/>
+              <a:t>evelopers</a:t>
+            </a:r>
+            <a:endParaRPr lang="nl-BE" dirty="0" smtClean="0"/>
+          </a:p>
+          <a:p>
+            <a:pPr lvl="1"/>
             <a:r>
               <a:rPr lang="nl-BE" dirty="0"/>
               <a:t>Smart &amp; get things </a:t>
@@ -3537,19 +3566,32 @@
               <a:rPr lang="nl-BE" dirty="0" smtClean="0"/>
               <a:t>done</a:t>
             </a:r>
+          </a:p>
+          <a:p>
+            <a:pPr lvl="1"/>
+            <a:r>
+              <a:rPr lang="nl-BE" dirty="0" smtClean="0"/>
+              <a:t>Communicatief </a:t>
+            </a:r>
             <a:endParaRPr lang="nl-BE" dirty="0" smtClean="0"/>
           </a:p>
           <a:p>
-            <a:r>
-              <a:rPr lang="nl-BE" dirty="0" smtClean="0"/>
-              <a:t>Communicatief </a:t>
-            </a:r>
-          </a:p>
-          <a:p>
+            <a:pPr lvl="1"/>
             <a:r>
               <a:rPr lang="nl-BE" dirty="0" smtClean="0"/>
               <a:t>Teamplayers</a:t>
             </a:r>
+          </a:p>
+          <a:p>
+            <a:r>
+              <a:rPr lang="nl-BE" dirty="0"/>
+              <a:t>Code </a:t>
+            </a:r>
+            <a:r>
+              <a:rPr lang="nl-BE" dirty="0" smtClean="0"/>
+              <a:t>test</a:t>
+            </a:r>
+            <a:endParaRPr lang="nl-BE" dirty="0" smtClean="0"/>
           </a:p>
           <a:p>
             <a:pPr marL="45720" indent="0">
@@ -3615,7 +3657,11 @@
           <a:p>
             <a:r>
               <a:rPr lang="nl-BE" dirty="0" smtClean="0"/>
-              <a:t>Onze ervaring</a:t>
+              <a:t>Onze </a:t>
+            </a:r>
+            <a:r>
+              <a:rPr lang="nl-BE" dirty="0" smtClean="0"/>
+              <a:t>expertise</a:t>
             </a:r>
             <a:endParaRPr lang="nl-BE" dirty="0"/>
           </a:p>
@@ -3638,40 +3684,45 @@
           </a:bodyPr>
           <a:lstStyle/>
           <a:p>
-            <a:pPr marL="45720" indent="0">
-              <a:buNone/>
-            </a:pPr>
-            <a:r>
-              <a:rPr lang="nl-BE" dirty="0" smtClean="0"/>
-              <a:t>Verschillende applicatiedomeinen:</a:t>
-            </a:r>
-          </a:p>
-          <a:p>
-            <a:r>
-              <a:rPr lang="nl-BE" dirty="0" smtClean="0"/>
-              <a:t>Security</a:t>
-            </a:r>
-          </a:p>
-          <a:p>
-            <a:r>
-              <a:rPr lang="nl-BE" dirty="0" smtClean="0"/>
-              <a:t>Frameworks</a:t>
-            </a:r>
-          </a:p>
-          <a:p>
-            <a:r>
-              <a:rPr lang="nl-BE" dirty="0" smtClean="0"/>
-              <a:t>...</a:t>
-            </a:r>
-          </a:p>
-          <a:p>
+            <a:r>
+              <a:rPr lang="nl-BE" dirty="0" smtClean="0"/>
+              <a:t>Webapplicaties/websites</a:t>
+            </a:r>
+          </a:p>
+          <a:p>
+            <a:r>
+              <a:rPr lang="nl-BE" dirty="0" smtClean="0"/>
+              <a:t>Desktopapplicaties</a:t>
+            </a:r>
+          </a:p>
+          <a:p>
+            <a:r>
+              <a:rPr lang="nl-BE" dirty="0" smtClean="0"/>
+              <a:t>Mobile apps</a:t>
+            </a:r>
+          </a:p>
+          <a:p>
+            <a:r>
+              <a:rPr lang="nl-BE" dirty="0" smtClean="0"/>
+              <a:t>Cloud </a:t>
+            </a:r>
+            <a:r>
+              <a:rPr lang="nl-BE" dirty="0"/>
+              <a:t>Services</a:t>
+            </a:r>
+          </a:p>
+          <a:p>
+            <a:r>
+              <a:rPr lang="nl-BE" dirty="0" smtClean="0"/>
+              <a:t>DevOps</a:t>
+            </a:r>
+          </a:p>
+          <a:p>
+            <a:r>
+              <a:rPr lang="nl-BE" dirty="0" smtClean="0"/>
+              <a:t>Continuous integration</a:t>
+            </a:r>
             <a:endParaRPr lang="nl-BE" dirty="0"/>
-          </a:p>
-          <a:p>
-            <a:r>
-              <a:rPr lang="nl-BE" dirty="0" smtClean="0"/>
-              <a:t>Green field brownfield, ...</a:t>
-            </a:r>
           </a:p>
           <a:p>
             <a:endParaRPr lang="nl-BE" dirty="0" smtClean="0"/>
@@ -3747,7 +3798,7 @@
         <p:spPr/>
         <p:txBody>
           <a:bodyPr>
-            <a:normAutofit fontScale="92500" lnSpcReduction="10000"/>
+            <a:normAutofit fontScale="85000" lnSpcReduction="20000"/>
           </a:bodyPr>
           <a:lstStyle/>
           <a:p>
@@ -3756,8 +3807,22 @@
             </a:pPr>
             <a:r>
               <a:rPr lang="nl-BE" dirty="0" smtClean="0"/>
-              <a:t>Een team van doorwinterde consultants met een waaier aan referenties in verscheidene sectoren in kleine en grote bedrijven op de belgische markt</a:t>
-            </a:r>
+              <a:t>Een team </a:t>
+            </a:r>
+            <a:r>
+              <a:rPr lang="nl-BE" dirty="0" smtClean="0"/>
+              <a:t>van doorwinterde consultants met een waaier aan referenties in verscheidene sectoren in kleine en grote bedrijven op de belgische </a:t>
+            </a:r>
+            <a:r>
+              <a:rPr lang="nl-BE" dirty="0" smtClean="0"/>
+              <a:t>markt</a:t>
+            </a:r>
+          </a:p>
+          <a:p>
+            <a:pPr marL="45720" indent="0">
+              <a:buNone/>
+            </a:pPr>
+            <a:endParaRPr lang="nl-BE" dirty="0" smtClean="0"/>
           </a:p>
           <a:p>
             <a:r>
@@ -3792,6 +3857,13 @@
           <a:p>
             <a:r>
               <a:rPr lang="nl-BE" dirty="0" smtClean="0"/>
+              <a:t>BNP Paribas</a:t>
+            </a:r>
+            <a:endParaRPr lang="nl-BE" dirty="0" smtClean="0"/>
+          </a:p>
+          <a:p>
+            <a:r>
+              <a:rPr lang="nl-BE" dirty="0" smtClean="0"/>
               <a:t>Ypto(NMBS)</a:t>
             </a:r>
           </a:p>
@@ -3804,8 +3876,15 @@
           <a:p>
             <a:r>
               <a:rPr lang="nl-BE" dirty="0" smtClean="0"/>
+              <a:t>Macadam</a:t>
+            </a:r>
+          </a:p>
+          <a:p>
+            <a:r>
+              <a:rPr lang="nl-BE" dirty="0" smtClean="0"/>
               <a:t>...</a:t>
             </a:r>
+            <a:endParaRPr lang="nl-BE" dirty="0" smtClean="0"/>
           </a:p>
           <a:p>
             <a:endParaRPr lang="nl-BE" dirty="0" smtClean="0"/>
@@ -3859,7 +3938,7 @@
           <a:p>
             <a:r>
               <a:rPr lang="nl-BE" dirty="0" smtClean="0"/>
-              <a:t>Hoe onderscheiden we ons?</a:t>
+              <a:t>Onze projecten</a:t>
             </a:r>
             <a:endParaRPr lang="nl-BE" dirty="0"/>
           </a:p>
@@ -3881,48 +3960,46 @@
           <a:lstStyle/>
           <a:p>
             <a:r>
-              <a:rPr lang="nl-BE" dirty="0"/>
-              <a:t>work ethics: </a:t>
-            </a:r>
-            <a:r>
-              <a:rPr lang="nl-BE" dirty="0" smtClean="0"/>
-              <a:t>dedication, professionalism &amp; quality</a:t>
-            </a:r>
-          </a:p>
-          <a:p>
-            <a:r>
-              <a:rPr lang="nl-BE" dirty="0" smtClean="0"/>
-              <a:t>Focus op kwaliteit: clean maintainable documented and testable code</a:t>
-            </a:r>
-          </a:p>
-          <a:p>
-            <a:r>
-              <a:rPr lang="nl-BE" dirty="0" smtClean="0"/>
-              <a:t>Tevreden werknemers en klanten zijn absoluut topprioriteit</a:t>
-            </a:r>
-          </a:p>
-          <a:p>
-            <a:r>
-              <a:rPr lang="nl-BE" dirty="0" smtClean="0"/>
-              <a:t>Tech enthusiasts, up-to-date met de nieuwste technologïeen</a:t>
-            </a:r>
-          </a:p>
-          <a:p>
-            <a:r>
-              <a:rPr lang="nl-BE" dirty="0"/>
-              <a:t>Greenfield &amp; Brownfield </a:t>
-            </a:r>
-            <a:r>
-              <a:rPr lang="nl-BE" dirty="0" smtClean="0"/>
-              <a:t>development</a:t>
-            </a:r>
+              <a:rPr lang="nl-BE" dirty="0" smtClean="0"/>
+              <a:t>Stockoma</a:t>
+            </a:r>
+          </a:p>
+          <a:p>
+            <a:r>
+              <a:rPr lang="nl-BE" dirty="0" smtClean="0"/>
+              <a:t>Facturatieprogramma</a:t>
+            </a:r>
+            <a:endParaRPr lang="nl-BE" dirty="0" smtClean="0"/>
+          </a:p>
+          <a:p>
+            <a:r>
+              <a:rPr lang="nl-BE" dirty="0" smtClean="0"/>
+              <a:t>Tafeltennisclub TTC </a:t>
+            </a:r>
+            <a:r>
+              <a:rPr lang="nl-BE" dirty="0" smtClean="0"/>
+              <a:t>Erembodegem</a:t>
+            </a:r>
+          </a:p>
+          <a:p>
+            <a:r>
+              <a:rPr lang="nl-BE" dirty="0" smtClean="0"/>
+              <a:t>Onze blog</a:t>
+            </a:r>
+          </a:p>
+          <a:p>
+            <a:r>
+              <a:rPr lang="nl-BE" dirty="0" smtClean="0"/>
+              <a:t>...</a:t>
+            </a:r>
+            <a:endParaRPr lang="nl-BE" dirty="0" smtClean="0"/>
           </a:p>
         </p:txBody>
       </p:sp>
     </p:spTree>
     <p:extLst>
       <p:ext uri="{BB962C8B-B14F-4D97-AF65-F5344CB8AC3E}">
-        <p14:creationId xmlns:p14="http://schemas.microsoft.com/office/powerpoint/2010/main" val="3442808346"/>
+        <p14:creationId xmlns:p14="http://schemas.microsoft.com/office/powerpoint/2010/main" val="1156673050"/>
       </p:ext>
     </p:extLst>
   </p:cSld>
@@ -3966,7 +4043,7 @@
           <a:p>
             <a:r>
               <a:rPr lang="nl-BE" dirty="0" smtClean="0"/>
-              <a:t>Projecten</a:t>
+              <a:t>Hoe onderscheiden we ons?</a:t>
             </a:r>
             <a:endParaRPr lang="nl-BE" dirty="0"/>
           </a:p>
@@ -3988,31 +4065,65 @@
           <a:lstStyle/>
           <a:p>
             <a:r>
-              <a:rPr lang="nl-BE" dirty="0" smtClean="0"/>
-              <a:t>Stockoma(in progress)</a:t>
-            </a:r>
-          </a:p>
-          <a:p>
-            <a:r>
-              <a:rPr lang="nl-BE" dirty="0" smtClean="0"/>
-              <a:t>Facturatieprogramma</a:t>
-            </a:r>
-          </a:p>
-          <a:p>
-            <a:r>
-              <a:rPr lang="nl-BE" dirty="0" smtClean="0">
-                <a:hlinkClick r:id="rId2"/>
-              </a:rPr>
-              <a:t>Tafeltennisclub TTC Erembodegem</a:t>
-            </a:r>
-            <a:endParaRPr lang="nl-BE" dirty="0"/>
+              <a:rPr lang="nl-BE" dirty="0"/>
+              <a:t>Tech enthusiasts, up-to-date met de nieuwste </a:t>
+            </a:r>
+            <a:r>
+              <a:rPr lang="nl-BE" dirty="0" smtClean="0"/>
+              <a:t>technologïeen</a:t>
+            </a:r>
+            <a:endParaRPr lang="nl-BE" dirty="0" smtClean="0"/>
+          </a:p>
+          <a:p>
+            <a:r>
+              <a:rPr lang="nl-BE" dirty="0" smtClean="0"/>
+              <a:t>Clean, maintainable, </a:t>
+            </a:r>
+            <a:r>
+              <a:rPr lang="nl-BE" dirty="0" smtClean="0"/>
+              <a:t>documented and testable </a:t>
+            </a:r>
+            <a:r>
+              <a:rPr lang="nl-BE" dirty="0" smtClean="0"/>
+              <a:t>code</a:t>
+            </a:r>
+          </a:p>
+          <a:p>
+            <a:r>
+              <a:rPr lang="nl-BE" dirty="0"/>
+              <a:t>Work ethics: dedication, professionalism &amp; </a:t>
+            </a:r>
+            <a:r>
+              <a:rPr lang="nl-BE" dirty="0" smtClean="0"/>
+              <a:t>quality</a:t>
+            </a:r>
+            <a:endParaRPr lang="nl-BE" dirty="0" smtClean="0"/>
+          </a:p>
+          <a:p>
+            <a:r>
+              <a:rPr lang="nl-BE" dirty="0" smtClean="0"/>
+              <a:t>Onze</a:t>
+            </a:r>
+            <a:r>
+              <a:rPr lang="nl-BE" dirty="0" smtClean="0"/>
+              <a:t> klanten </a:t>
+            </a:r>
+            <a:r>
+              <a:rPr lang="nl-BE" dirty="0" smtClean="0"/>
+              <a:t>zijn </a:t>
+            </a:r>
+            <a:r>
+              <a:rPr lang="nl-BE" dirty="0" smtClean="0"/>
+              <a:t>absolute topprioriteit</a:t>
+            </a:r>
+            <a:endParaRPr lang="nl-BE" dirty="0" smtClean="0"/>
           </a:p>
         </p:txBody>
       </p:sp>
     </p:spTree>
     <p:extLst>
       <p:ext uri="{BB962C8B-B14F-4D97-AF65-F5344CB8AC3E}">
-        <p14:creationId xmlns:p14="http://schemas.microsoft.com/office/powerpoint/2010/main" val="1156673050"/>
+        <p14:creationId xmlns:p14="http://schemas.microsoft.com/office/powerpoint/2010/main" val="3442808346"/>
       </p:ext>
     </p:extLst>
   </p:cSld>
@@ -4121,9 +4232,10 @@
           </a:p>
           <a:p>
             <a:r>
-              <a:rPr lang="nl-BE" dirty="0"/>
-              <a:t>Angular 4+</a:t>
-            </a:r>
+              <a:rPr lang="nl-BE" dirty="0" smtClean="0"/>
+              <a:t>Angular 2+</a:t>
+            </a:r>
+            <a:endParaRPr lang="nl-BE" dirty="0"/>
           </a:p>
           <a:p>
             <a:r>
@@ -4134,8 +4246,9 @@
           <a:p>
             <a:r>
               <a:rPr lang="nl-BE" dirty="0" smtClean="0"/>
-              <a:t>Wpf</a:t>
-            </a:r>
+              <a:t>WPF</a:t>
+            </a:r>
+            <a:endParaRPr lang="nl-BE" dirty="0" smtClean="0"/>
           </a:p>
           <a:p>
             <a:r>
@@ -4216,7 +4329,7 @@
         </p:spPr>
         <p:txBody>
           <a:bodyPr vert="horz" lIns="91440" tIns="45720" rIns="91440" bIns="45720" rtlCol="0">
-            <a:normAutofit fontScale="77500" lnSpcReduction="20000"/>
+            <a:normAutofit fontScale="62500" lnSpcReduction="20000"/>
           </a:bodyPr>
           <a:lstStyle>
             <a:lvl1pPr marL="228600" indent="-182880" algn="l" defTabSz="914400" rtl="0" eaLnBrk="1" latinLnBrk="0" hangingPunct="1">
@@ -4449,6 +4562,13 @@
           <a:p>
             <a:r>
               <a:rPr lang="nl-BE" dirty="0" smtClean="0"/>
+              <a:t>XP</a:t>
+            </a:r>
+            <a:endParaRPr lang="nl-BE" dirty="0" smtClean="0"/>
+          </a:p>
+          <a:p>
+            <a:r>
+              <a:rPr lang="nl-BE" dirty="0" smtClean="0"/>
               <a:t>Node JS</a:t>
             </a:r>
           </a:p>
@@ -4469,6 +4589,24 @@
               <a:rPr lang="nl-BE" dirty="0" smtClean="0"/>
               <a:t>CSS</a:t>
             </a:r>
+          </a:p>
+          <a:p>
+            <a:r>
+              <a:rPr lang="nl-BE" dirty="0" smtClean="0"/>
+              <a:t>Powershell</a:t>
+            </a:r>
+          </a:p>
+          <a:p>
+            <a:r>
+              <a:rPr lang="nl-BE" dirty="0" smtClean="0"/>
+              <a:t>Bash</a:t>
+            </a:r>
+          </a:p>
+          <a:p>
+            <a:pPr marL="45720" indent="0">
+              <a:buNone/>
+            </a:pPr>
+            <a:endParaRPr lang="nl-BE" dirty="0" smtClean="0"/>
           </a:p>
           <a:p>
             <a:endParaRPr lang="nl-BE" dirty="0" smtClean="0"/>
@@ -4749,18 +4887,22 @@
           <a:p>
             <a:r>
               <a:rPr lang="nl-BE" dirty="0" smtClean="0"/>
-              <a:t>Entity Framework</a:t>
-            </a:r>
-          </a:p>
-          <a:p>
-            <a:r>
-              <a:rPr lang="nl-BE" dirty="0"/>
-              <a:t>Cloud </a:t>
-            </a:r>
-            <a:r>
-              <a:rPr lang="nl-BE" dirty="0" smtClean="0"/>
-              <a:t>services</a:t>
-            </a:r>
+              <a:t>Entity </a:t>
+            </a:r>
+            <a:r>
+              <a:rPr lang="nl-BE" dirty="0" smtClean="0"/>
+              <a:t>Framework</a:t>
+            </a:r>
+          </a:p>
+          <a:p>
+            <a:r>
+              <a:rPr lang="nl-BE" dirty="0" smtClean="0"/>
+              <a:t>Cloud Services</a:t>
+            </a:r>
+            <a:endParaRPr lang="nl-BE" dirty="0" smtClean="0"/>
+          </a:p>
+          <a:p>
+            <a:endParaRPr lang="nl-BE" dirty="0" smtClean="0"/>
           </a:p>
           <a:p>
             <a:endParaRPr lang="nl-BE" dirty="0" smtClean="0"/>

</xml_diff>